<commit_message>
minor optimizations presentation part 2
</commit_message>
<xml_diff>
--- a/Web-Frontend-Accessibility-02.pptx
+++ b/Web-Frontend-Accessibility-02.pptx
@@ -8033,7 +8033,7 @@
         <p:spPr/>
         <p:txBody>
           <a:bodyPr>
-            <a:normAutofit lnSpcReduction="10000"/>
+            <a:normAutofit fontScale="92500"/>
           </a:bodyPr>
           <a:lstStyle/>
           <a:p>
@@ -8078,11 +8078,11 @@
           <a:p>
             <a:r>
               <a:rPr lang="en-DE" b="1" dirty="0"/>
-              <a:t>Focusable Elements </a:t>
+              <a:t>Focusable / Clickable Elements </a:t>
             </a:r>
             <a:r>
               <a:rPr lang="en-DE" dirty="0"/>
-              <a:t>(Fokussierbare Elemente)</a:t>
+              <a:t>(Fokussierbare / Klickbare Elemente)</a:t>
             </a:r>
           </a:p>
           <a:p>
@@ -8227,7 +8227,7 @@
             </a:r>
             <a:r>
               <a:rPr lang="de-DE" b="1" dirty="0"/>
-              <a:t>Navigation</a:t>
+              <a:t>Navigation (VO Rotor Landmarks)</a:t>
             </a:r>
           </a:p>
           <a:p>

</xml_diff>

<commit_message>
added presentation part 3 and some solution files for the exercises
</commit_message>
<xml_diff>
--- a/Web-Frontend-Accessibility-02.pptx
+++ b/Web-Frontend-Accessibility-02.pptx
@@ -2112,7 +2112,7 @@
           <a:p>
             <a:fld id="{C275D129-3F7C-D440-B949-9E682A9C35B9}" type="datetimeFigureOut">
               <a:rPr lang="de-DE" smtClean="0"/>
-              <a:t>13.01.25</a:t>
+              <a:t>17.01.25</a:t>
             </a:fld>
             <a:endParaRPr lang="de-DE"/>
           </a:p>
@@ -2826,7 +2826,7 @@
           <a:p>
             <a:fld id="{EFD02665-02A2-134A-B107-F4B484FCD166}" type="datetimeFigureOut">
               <a:rPr lang="de-DE" smtClean="0"/>
-              <a:t>13.01.25</a:t>
+              <a:t>17.01.25</a:t>
             </a:fld>
             <a:endParaRPr lang="de-DE"/>
           </a:p>
@@ -3024,7 +3024,7 @@
           <a:p>
             <a:fld id="{EFD02665-02A2-134A-B107-F4B484FCD166}" type="datetimeFigureOut">
               <a:rPr lang="de-DE" smtClean="0"/>
-              <a:t>13.01.25</a:t>
+              <a:t>17.01.25</a:t>
             </a:fld>
             <a:endParaRPr lang="de-DE"/>
           </a:p>
@@ -3232,7 +3232,7 @@
           <a:p>
             <a:fld id="{EFD02665-02A2-134A-B107-F4B484FCD166}" type="datetimeFigureOut">
               <a:rPr lang="de-DE" smtClean="0"/>
-              <a:t>13.01.25</a:t>
+              <a:t>17.01.25</a:t>
             </a:fld>
             <a:endParaRPr lang="de-DE"/>
           </a:p>
@@ -3430,7 +3430,7 @@
           <a:p>
             <a:fld id="{EFD02665-02A2-134A-B107-F4B484FCD166}" type="datetimeFigureOut">
               <a:rPr lang="de-DE" smtClean="0"/>
-              <a:t>13.01.25</a:t>
+              <a:t>17.01.25</a:t>
             </a:fld>
             <a:endParaRPr lang="de-DE"/>
           </a:p>
@@ -3705,7 +3705,7 @@
           <a:p>
             <a:fld id="{EFD02665-02A2-134A-B107-F4B484FCD166}" type="datetimeFigureOut">
               <a:rPr lang="de-DE" smtClean="0"/>
-              <a:t>13.01.25</a:t>
+              <a:t>17.01.25</a:t>
             </a:fld>
             <a:endParaRPr lang="de-DE"/>
           </a:p>
@@ -3970,7 +3970,7 @@
           <a:p>
             <a:fld id="{EFD02665-02A2-134A-B107-F4B484FCD166}" type="datetimeFigureOut">
               <a:rPr lang="de-DE" smtClean="0"/>
-              <a:t>13.01.25</a:t>
+              <a:t>17.01.25</a:t>
             </a:fld>
             <a:endParaRPr lang="de-DE"/>
           </a:p>
@@ -4382,7 +4382,7 @@
           <a:p>
             <a:fld id="{EFD02665-02A2-134A-B107-F4B484FCD166}" type="datetimeFigureOut">
               <a:rPr lang="de-DE" smtClean="0"/>
-              <a:t>13.01.25</a:t>
+              <a:t>17.01.25</a:t>
             </a:fld>
             <a:endParaRPr lang="de-DE"/>
           </a:p>
@@ -4523,7 +4523,7 @@
           <a:p>
             <a:fld id="{EFD02665-02A2-134A-B107-F4B484FCD166}" type="datetimeFigureOut">
               <a:rPr lang="de-DE" smtClean="0"/>
-              <a:t>13.01.25</a:t>
+              <a:t>17.01.25</a:t>
             </a:fld>
             <a:endParaRPr lang="de-DE"/>
           </a:p>
@@ -4636,7 +4636,7 @@
           <a:p>
             <a:fld id="{EFD02665-02A2-134A-B107-F4B484FCD166}" type="datetimeFigureOut">
               <a:rPr lang="de-DE" smtClean="0"/>
-              <a:t>13.01.25</a:t>
+              <a:t>17.01.25</a:t>
             </a:fld>
             <a:endParaRPr lang="de-DE"/>
           </a:p>
@@ -4947,7 +4947,7 @@
           <a:p>
             <a:fld id="{EFD02665-02A2-134A-B107-F4B484FCD166}" type="datetimeFigureOut">
               <a:rPr lang="de-DE" smtClean="0"/>
-              <a:t>13.01.25</a:t>
+              <a:t>17.01.25</a:t>
             </a:fld>
             <a:endParaRPr lang="de-DE"/>
           </a:p>
@@ -5235,7 +5235,7 @@
           <a:p>
             <a:fld id="{EFD02665-02A2-134A-B107-F4B484FCD166}" type="datetimeFigureOut">
               <a:rPr lang="de-DE" smtClean="0"/>
-              <a:t>13.01.25</a:t>
+              <a:t>17.01.25</a:t>
             </a:fld>
             <a:endParaRPr lang="de-DE"/>
           </a:p>
@@ -5476,7 +5476,7 @@
           <a:p>
             <a:fld id="{EFD02665-02A2-134A-B107-F4B484FCD166}" type="datetimeFigureOut">
               <a:rPr lang="de-DE" smtClean="0"/>
-              <a:t>13.01.25</a:t>
+              <a:t>17.01.25</a:t>
             </a:fld>
             <a:endParaRPr lang="de-DE"/>
           </a:p>
@@ -21013,14 +21013,12 @@
             <a:r>
               <a:rPr lang="de-DE" sz="2000" dirty="0">
                 <a:solidFill>
-                  <a:schemeClr val="accent6">
-                    <a:lumMod val="75000"/>
-                  </a:schemeClr>
-                </a:solidFill>
-                <a:latin typeface="Courier New" panose="02070309020205020404" pitchFamily="49" charset="0"/>
-                <a:cs typeface="Courier New" panose="02070309020205020404" pitchFamily="49" charset="0"/>
-              </a:rPr>
-              <a:t>type</a:t>
+                  <a:schemeClr val="accent3"/>
+                </a:solidFill>
+                <a:latin typeface="Courier New" panose="02070309020205020404" pitchFamily="49" charset="0"/>
+                <a:cs typeface="Courier New" panose="02070309020205020404" pitchFamily="49" charset="0"/>
+              </a:rPr>
+              <a:t>type=</a:t>
             </a:r>
             <a:r>
               <a:rPr lang="de-DE" sz="2000" dirty="0">
@@ -21030,7 +21028,7 @@
                 <a:latin typeface="Courier New" panose="02070309020205020404" pitchFamily="49" charset="0"/>
                 <a:cs typeface="Courier New" panose="02070309020205020404" pitchFamily="49" charset="0"/>
               </a:rPr>
-              <a:t>="</a:t>
+              <a:t>"</a:t>
             </a:r>
             <a:r>
               <a:rPr lang="de-DE" sz="2000" dirty="0" err="1">

</xml_diff>